<commit_message>
upload the new files
</commit_message>
<xml_diff>
--- a/SoftUni Lessons/JavaScript Development/JavaScript Basics March 2020/07. ПРОВЕРКИ/Presentation and Problems Description/PB-JS-Conditional-Statements.pptx
+++ b/SoftUni Lessons/JavaScript Development/JavaScript Basics March 2020/07. ПРОВЕРКИ/Presentation and Problems Description/PB-JS-Conditional-Statements.pptx
@@ -349,7 +349,7 @@
             <a:fld id="{FE5B4EDC-59C0-49C7-8ADA-5A781B329E02}" type="datetimeFigureOut">
               <a:rPr lang="en-US"/>
               <a:pPr/>
-              <a:t>3/5/2020</a:t>
+              <a:t>3/17/2020</a:t>
             </a:fld>
             <a:endParaRPr dirty="0"/>
           </a:p>
@@ -548,7 +548,7 @@
             <a:fld id="{F2D8D46A-B586-417D-BFBD-8C8FE0AAF762}" type="datetimeFigureOut">
               <a:rPr lang="en-US" smtClean="0"/>
               <a:pPr/>
-              <a:t>3/5/2020</a:t>
+              <a:t>3/17/2020</a:t>
             </a:fld>
             <a:endParaRPr lang="en-US" dirty="0"/>
           </a:p>
@@ -2862,7 +2862,7 @@
             <a:fld id="{055373AC-9AA7-423B-BA00-BA1C74164DBD}" type="datetime1">
               <a:rPr lang="en-US" smtClean="0"/>
               <a:pPr/>
-              <a:t>3/5/2020</a:t>
+              <a:t>3/17/2020</a:t>
             </a:fld>
             <a:endParaRPr lang="en-US" dirty="0"/>
           </a:p>
@@ -3540,7 +3540,7 @@
             <a:fld id="{055373AC-9AA7-423B-BA00-BA1C74164DBD}" type="datetime1">
               <a:rPr lang="en-US" smtClean="0"/>
               <a:pPr/>
-              <a:t>3/5/2020</a:t>
+              <a:t>3/17/2020</a:t>
             </a:fld>
             <a:endParaRPr lang="en-US" dirty="0"/>
           </a:p>
@@ -3925,7 +3925,7 @@
             <a:fld id="{055373AC-9AA7-423B-BA00-BA1C74164DBD}" type="datetime1">
               <a:rPr lang="en-US" smtClean="0"/>
               <a:pPr/>
-              <a:t>3/5/2020</a:t>
+              <a:t>3/17/2020</a:t>
             </a:fld>
             <a:endParaRPr lang="en-US" dirty="0"/>
           </a:p>
@@ -5791,7 +5791,7 @@
             <a:fld id="{055373AC-9AA7-423B-BA00-BA1C74164DBD}" type="datetime1">
               <a:rPr lang="en-US" smtClean="0"/>
               <a:pPr/>
-              <a:t>3/5/2020</a:t>
+              <a:t>3/17/2020</a:t>
             </a:fld>
             <a:endParaRPr lang="en-US" dirty="0"/>
           </a:p>
@@ -6505,7 +6505,7 @@
             <a:fld id="{055373AC-9AA7-423B-BA00-BA1C74164DBD}" type="datetime1">
               <a:rPr lang="en-US" smtClean="0"/>
               <a:pPr/>
-              <a:t>3/5/2020</a:t>
+              <a:t>3/17/2020</a:t>
             </a:fld>
             <a:endParaRPr lang="en-US" dirty="0"/>
           </a:p>
@@ -7105,7 +7105,7 @@
             <a:fld id="{055373AC-9AA7-423B-BA00-BA1C74164DBD}" type="datetime1">
               <a:rPr lang="en-US" smtClean="0"/>
               <a:pPr/>
-              <a:t>3/5/2020</a:t>
+              <a:t>3/17/2020</a:t>
             </a:fld>
             <a:endParaRPr lang="en-US" dirty="0"/>
           </a:p>
@@ -7474,7 +7474,7 @@
             <a:fld id="{055373AC-9AA7-423B-BA00-BA1C74164DBD}" type="datetime1">
               <a:rPr lang="en-US" smtClean="0"/>
               <a:pPr/>
-              <a:t>3/5/2020</a:t>
+              <a:t>3/17/2020</a:t>
             </a:fld>
             <a:endParaRPr lang="en-US" dirty="0"/>
           </a:p>
@@ -8142,7 +8142,7 @@
             <a:fld id="{055373AC-9AA7-423B-BA00-BA1C74164DBD}" type="datetime1">
               <a:rPr lang="en-US" smtClean="0"/>
               <a:pPr/>
-              <a:t>3/5/2020</a:t>
+              <a:t>3/17/2020</a:t>
             </a:fld>
             <a:endParaRPr lang="en-US" dirty="0"/>
           </a:p>
@@ -8350,7 +8350,7 @@
             <a:fld id="{055373AC-9AA7-423B-BA00-BA1C74164DBD}" type="datetime1">
               <a:rPr lang="en-US" smtClean="0"/>
               <a:pPr/>
-              <a:t>3/5/2020</a:t>
+              <a:t>3/17/2020</a:t>
             </a:fld>
             <a:endParaRPr lang="en-US" dirty="0"/>
           </a:p>
@@ -22085,16 +22085,20 @@
               <a:t>function isEven</a:t>
             </a:r>
             <a:r>
-              <a:rPr lang="bg-BG" sz="2800" dirty="0"/>
+              <a:rPr lang="bg-BG" sz="2800" dirty="0" smtClean="0"/>
               <a:t>(</a:t>
             </a:r>
             <a:r>
-              <a:rPr lang="en-US" sz="2800" dirty="0"/>
-              <a:t>input</a:t>
+              <a:rPr lang="en-US" sz="2800" dirty="0" smtClean="0"/>
+              <a:t>number</a:t>
+            </a:r>
+            <a:r>
+              <a:rPr lang="it-IT" sz="2800" dirty="0" smtClean="0"/>
+              <a:t>) </a:t>
             </a:r>
             <a:r>
               <a:rPr lang="it-IT" sz="2800" dirty="0"/>
-              <a:t>) {</a:t>
+              <a:t>{</a:t>
             </a:r>
           </a:p>
           <a:p>
@@ -22109,8 +22113,13 @@
             </a:pPr>
             <a:r>
               <a:rPr lang="it-IT" sz="2800" dirty="0"/>
-              <a:t>  let num = parseInt(input.shift());</a:t>
-            </a:r>
+              <a:t>  let num = </a:t>
+            </a:r>
+            <a:r>
+              <a:rPr lang="it-IT" sz="2800" dirty="0" smtClean="0"/>
+              <a:t>parseInt(number);</a:t>
+            </a:r>
+            <a:endParaRPr lang="it-IT" sz="2800" dirty="0"/>
           </a:p>
           <a:p>
             <a:pPr eaLnBrk="0" hangingPunct="0">
@@ -25351,7 +25360,15 @@
             </a:pPr>
             <a:r>
               <a:rPr lang="it-IT" sz="2300" dirty="0"/>
-              <a:t>function number0to9([arg1]) {</a:t>
+              <a:t>function </a:t>
+            </a:r>
+            <a:r>
+              <a:rPr lang="it-IT" sz="2300" dirty="0" smtClean="0"/>
+              <a:t>number0to9(number) </a:t>
+            </a:r>
+            <a:r>
+              <a:rPr lang="it-IT" sz="2300" dirty="0"/>
+              <a:t>{</a:t>
             </a:r>
           </a:p>
           <a:p>
@@ -25366,8 +25383,13 @@
             </a:pPr>
             <a:r>
               <a:rPr lang="it-IT" sz="2300" dirty="0"/>
-              <a:t>  let num = parseInt(arg1);</a:t>
-            </a:r>
+              <a:t>  let num = </a:t>
+            </a:r>
+            <a:r>
+              <a:rPr lang="it-IT" sz="2300" dirty="0" smtClean="0"/>
+              <a:t>parseInt(number);</a:t>
+            </a:r>
+            <a:endParaRPr lang="it-IT" sz="2300" dirty="0"/>
           </a:p>
           <a:p>
             <a:pPr eaLnBrk="0" hangingPunct="0">
@@ -27071,9 +27093,10 @@
               <a:t> </a:t>
             </a:r>
             <a:r>
-              <a:rPr lang="en-US" sz="2500" dirty="0"/>
-              <a:t>Number(input.shift());</a:t>
-            </a:r>
+              <a:rPr lang="en-US" sz="2500" dirty="0" smtClean="0"/>
+              <a:t>Number(salary);</a:t>
+            </a:r>
+            <a:endParaRPr lang="en-US" sz="2500" dirty="0"/>
           </a:p>
           <a:p>
             <a:pPr eaLnBrk="0" hangingPunct="0">
@@ -28173,8 +28196,8 @@
         </p:nvSpPr>
         <p:spPr>
           <a:xfrm>
-            <a:off x="1695594" y="1371600"/>
-            <a:ext cx="8797636" cy="4762733"/>
+            <a:off x="1695594" y="1143000"/>
+            <a:ext cx="8797636" cy="5214349"/>
           </a:xfrm>
         </p:spPr>
         <p:txBody>
@@ -28190,13 +28213,50 @@
               </a:spcAft>
             </a:pPr>
             <a:r>
-              <a:rPr lang="en-US" sz="2400" dirty="0">
+              <a:rPr lang="en-US" sz="2400" dirty="0" smtClean="0">
                 <a:solidFill>
                   <a:schemeClr val="tx1"/>
                 </a:solidFill>
               </a:rPr>
-              <a:t>let shape = input.shift();</a:t>
-            </a:r>
+              <a:t>function </a:t>
+            </a:r>
+            <a:r>
+              <a:rPr lang="en-US" sz="2400" dirty="0" err="1" smtClean="0">
+                <a:solidFill>
+                  <a:schemeClr val="bg1"/>
+                </a:solidFill>
+              </a:rPr>
+              <a:t>areaOfFigures</a:t>
+            </a:r>
+            <a:r>
+              <a:rPr lang="en-US" sz="2400" dirty="0" smtClean="0">
+                <a:solidFill>
+                  <a:schemeClr val="bg1"/>
+                </a:solidFill>
+              </a:rPr>
+              <a:t>(</a:t>
+            </a:r>
+            <a:r>
+              <a:rPr lang="en-US" sz="2400" dirty="0" err="1" smtClean="0">
+                <a:solidFill>
+                  <a:schemeClr val="tx1"/>
+                </a:solidFill>
+              </a:rPr>
+              <a:t>shape,side,sideB</a:t>
+            </a:r>
+            <a:r>
+              <a:rPr lang="en-US" sz="2400" dirty="0" smtClean="0">
+                <a:solidFill>
+                  <a:schemeClr val="bg1"/>
+                </a:solidFill>
+              </a:rPr>
+              <a:t>){</a:t>
+            </a:r>
+            <a:endParaRPr lang="bg-BG" sz="2400" dirty="0">
+              <a:solidFill>
+                <a:schemeClr val="bg1"/>
+              </a:solidFill>
+            </a:endParaRPr>
           </a:p>
           <a:p>
             <a:pPr>
@@ -28208,12 +28268,20 @@
               </a:spcAft>
             </a:pPr>
             <a:r>
+              <a:rPr lang="en-US" sz="2400" dirty="0" smtClean="0">
+                <a:solidFill>
+                  <a:schemeClr val="tx1"/>
+                </a:solidFill>
+              </a:rPr>
+              <a:t>let </a:t>
+            </a:r>
+            <a:r>
               <a:rPr lang="en-US" sz="2400" dirty="0">
                 <a:solidFill>
                   <a:schemeClr val="tx1"/>
                 </a:solidFill>
               </a:rPr>
-              <a:t>let area = 0;</a:t>
+              <a:t>area = 0;</a:t>
             </a:r>
           </a:p>
           <a:p>
@@ -28273,8 +28341,45 @@
                   <a:schemeClr val="tx1"/>
                 </a:solidFill>
               </a:rPr>
-              <a:t>  let side = Number(input.shift());</a:t>
-            </a:r>
+              <a:t>  </a:t>
+            </a:r>
+            <a:r>
+              <a:rPr lang="en-US" sz="2400" dirty="0" smtClean="0">
+                <a:solidFill>
+                  <a:schemeClr val="tx1"/>
+                </a:solidFill>
+              </a:rPr>
+              <a:t>side </a:t>
+            </a:r>
+            <a:r>
+              <a:rPr lang="en-US" sz="2400" dirty="0">
+                <a:solidFill>
+                  <a:schemeClr val="tx1"/>
+                </a:solidFill>
+              </a:rPr>
+              <a:t>= </a:t>
+            </a:r>
+            <a:r>
+              <a:rPr lang="en-US" sz="2400" dirty="0">
+                <a:solidFill>
+                  <a:schemeClr val="tx1"/>
+                </a:solidFill>
+              </a:rPr>
+              <a:t>Number(side</a:t>
+            </a:r>
+            <a:r>
+              <a:rPr lang="en-US" sz="2400" dirty="0" smtClean="0">
+                <a:solidFill>
+                  <a:schemeClr val="tx1"/>
+                </a:solidFill>
+              </a:rPr>
+              <a:t>);</a:t>
+            </a:r>
+            <a:endParaRPr lang="en-US" sz="2400" dirty="0">
+              <a:solidFill>
+                <a:schemeClr val="tx1"/>
+              </a:solidFill>
+            </a:endParaRPr>
           </a:p>
           <a:p>
             <a:pPr>
@@ -28351,8 +28456,37 @@
                   <a:schemeClr val="tx1"/>
                 </a:solidFill>
               </a:rPr>
-              <a:t>  let sideA = Number(input.shift());</a:t>
-            </a:r>
+              <a:t>  </a:t>
+            </a:r>
+            <a:r>
+              <a:rPr lang="en-US" sz="2400" dirty="0" smtClean="0">
+                <a:solidFill>
+                  <a:schemeClr val="tx1"/>
+                </a:solidFill>
+              </a:rPr>
+              <a:t>side </a:t>
+            </a:r>
+            <a:r>
+              <a:rPr lang="en-US" sz="2400" dirty="0">
+                <a:solidFill>
+                  <a:schemeClr val="tx1"/>
+                </a:solidFill>
+              </a:rPr>
+              <a:t>= </a:t>
+            </a:r>
+            <a:r>
+              <a:rPr lang="en-US" sz="2400" dirty="0" smtClean="0">
+                <a:solidFill>
+                  <a:schemeClr val="tx1"/>
+                </a:solidFill>
+              </a:rPr>
+              <a:t>Number(side);</a:t>
+            </a:r>
+            <a:endParaRPr lang="en-US" sz="2400" dirty="0">
+              <a:solidFill>
+                <a:schemeClr val="tx1"/>
+              </a:solidFill>
+            </a:endParaRPr>
           </a:p>
           <a:p>
             <a:pPr>
@@ -28369,8 +28503,61 @@
                   <a:schemeClr val="tx1"/>
                 </a:solidFill>
               </a:rPr>
-              <a:t>  let sideB = Number(input.shift());</a:t>
-            </a:r>
+              <a:t>  </a:t>
+            </a:r>
+            <a:r>
+              <a:rPr lang="en-US" sz="2400" dirty="0" err="1" smtClean="0">
+                <a:solidFill>
+                  <a:schemeClr val="tx1"/>
+                </a:solidFill>
+              </a:rPr>
+              <a:t>sideB</a:t>
+            </a:r>
+            <a:r>
+              <a:rPr lang="en-US" sz="2400" dirty="0" smtClean="0">
+                <a:solidFill>
+                  <a:schemeClr val="tx1"/>
+                </a:solidFill>
+              </a:rPr>
+              <a:t> </a:t>
+            </a:r>
+            <a:r>
+              <a:rPr lang="en-US" sz="2400" dirty="0">
+                <a:solidFill>
+                  <a:schemeClr val="tx1"/>
+                </a:solidFill>
+              </a:rPr>
+              <a:t>= </a:t>
+            </a:r>
+            <a:r>
+              <a:rPr lang="en-US" sz="2400" dirty="0" smtClean="0">
+                <a:solidFill>
+                  <a:schemeClr val="tx1"/>
+                </a:solidFill>
+              </a:rPr>
+              <a:t>Number(</a:t>
+            </a:r>
+            <a:r>
+              <a:rPr lang="en-US" sz="2400" dirty="0" err="1" smtClean="0">
+                <a:solidFill>
+                  <a:schemeClr val="tx1"/>
+                </a:solidFill>
+              </a:rPr>
+              <a:t>sideB</a:t>
+            </a:r>
+            <a:r>
+              <a:rPr lang="en-US" sz="2400" dirty="0" smtClean="0">
+                <a:solidFill>
+                  <a:schemeClr val="tx1"/>
+                </a:solidFill>
+              </a:rPr>
+              <a:t>);</a:t>
+            </a:r>
+            <a:endParaRPr lang="en-US" sz="2400" dirty="0">
+              <a:solidFill>
+                <a:schemeClr val="tx1"/>
+              </a:solidFill>
+            </a:endParaRPr>
           </a:p>
           <a:p>
             <a:pPr>
@@ -28423,8 +28610,39 @@
                   <a:schemeClr val="tx1"/>
                 </a:solidFill>
               </a:rPr>
-              <a:t>console.log(area);</a:t>
-            </a:r>
+              <a:t>console.log(area</a:t>
+            </a:r>
+            <a:r>
+              <a:rPr lang="en-US" sz="2400" dirty="0" smtClean="0">
+                <a:solidFill>
+                  <a:schemeClr val="tx1"/>
+                </a:solidFill>
+              </a:rPr>
+              <a:t>);</a:t>
+            </a:r>
+          </a:p>
+          <a:p>
+            <a:pPr>
+              <a:spcBef>
+                <a:spcPts val="200"/>
+              </a:spcBef>
+              <a:spcAft>
+                <a:spcPts val="200"/>
+              </a:spcAft>
+            </a:pPr>
+            <a:r>
+              <a:rPr lang="en-US" sz="2400" dirty="0">
+                <a:solidFill>
+                  <a:schemeClr val="tx1"/>
+                </a:solidFill>
+              </a:rPr>
+              <a:t>}</a:t>
+            </a:r>
+            <a:endParaRPr lang="en-US" sz="2400" dirty="0">
+              <a:solidFill>
+                <a:schemeClr val="tx1"/>
+              </a:solidFill>
+            </a:endParaRPr>
           </a:p>
         </p:txBody>
       </p:sp>
@@ -28514,11 +28732,11 @@
           <a:lstStyle/>
           <a:p>
             <a:r>
-              <a:rPr lang="bg-BG" sz="2400" dirty="0"/>
+              <a:rPr lang="bg-BG" sz="2400" dirty="0" smtClean="0"/>
               <a:t>Тестване</a:t>
             </a:r>
             <a:r>
-              <a:rPr lang="bg-BG" sz="2400" dirty="0">
+              <a:rPr lang="bg-BG" sz="2400" dirty="0" smtClean="0">
                 <a:solidFill>
                   <a:prstClr val="white"/>
                 </a:solidFill>
@@ -28526,11 +28744,11 @@
               <a:t> </a:t>
             </a:r>
             <a:r>
-              <a:rPr lang="bg-BG" sz="2400" dirty="0"/>
+              <a:rPr lang="bg-BG" sz="2400" dirty="0" smtClean="0"/>
               <a:t>на</a:t>
             </a:r>
             <a:r>
-              <a:rPr lang="bg-BG" sz="2400" dirty="0">
+              <a:rPr lang="bg-BG" sz="2400" dirty="0" smtClean="0">
                 <a:solidFill>
                   <a:prstClr val="white"/>
                 </a:solidFill>
@@ -28538,15 +28756,15 @@
               <a:t> </a:t>
             </a:r>
             <a:r>
-              <a:rPr lang="bg-BG" sz="2400" dirty="0"/>
+              <a:rPr lang="bg-BG" sz="2400" dirty="0" smtClean="0"/>
               <a:t>решението</a:t>
             </a:r>
             <a:r>
-              <a:rPr lang="en-US" sz="2400" dirty="0"/>
+              <a:rPr lang="en-US" sz="2400" dirty="0" smtClean="0"/>
               <a:t>:</a:t>
             </a:r>
             <a:r>
-              <a:rPr lang="bg-BG" sz="2400" dirty="0">
+              <a:rPr lang="bg-BG" sz="2400" dirty="0" smtClean="0">
                 <a:solidFill>
                   <a:prstClr val="white"/>
                 </a:solidFill>
@@ -28554,7 +28772,7 @@
               <a:t>: </a:t>
             </a:r>
             <a:r>
-              <a:rPr lang="en-US" sz="2400" dirty="0">
+              <a:rPr lang="en-US" sz="2400" dirty="0" smtClean="0">
                 <a:solidFill>
                   <a:prstClr val="white"/>
                 </a:solidFill>
@@ -28640,39 +28858,26 @@
                                   </p:childTnLst>
                                 </p:cTn>
                               </p:par>
+                            </p:childTnLst>
+                          </p:cTn>
+                        </p:par>
+                      </p:childTnLst>
+                    </p:cTn>
+                  </p:par>
+                  <p:par>
+                    <p:cTn id="7" fill="hold">
+                      <p:stCondLst>
+                        <p:cond delay="indefinite"/>
+                      </p:stCondLst>
+                      <p:childTnLst>
+                        <p:par>
+                          <p:cTn id="8" fill="hold">
+                            <p:stCondLst>
+                              <p:cond delay="0"/>
+                            </p:stCondLst>
+                            <p:childTnLst>
                               <p:par>
-                                <p:cTn id="7" presetID="1" presetClass="entr" presetSubtype="0" fill="hold" grpId="0" nodeType="withEffect">
-                                  <p:stCondLst>
-                                    <p:cond delay="0"/>
-                                  </p:stCondLst>
-                                  <p:childTnLst>
-                                    <p:set>
-                                      <p:cBhvr>
-                                        <p:cTn id="8" dur="1" fill="hold">
-                                          <p:stCondLst>
-                                            <p:cond delay="0"/>
-                                          </p:stCondLst>
-                                        </p:cTn>
-                                        <p:tgtEl>
-                                          <p:spTgt spid="5">
-                                            <p:txEl>
-                                              <p:pRg st="0" end="0"/>
-                                            </p:txEl>
-                                          </p:spTgt>
-                                        </p:tgtEl>
-                                        <p:attrNameLst>
-                                          <p:attrName>style.visibility</p:attrName>
-                                        </p:attrNameLst>
-                                      </p:cBhvr>
-                                      <p:to>
-                                        <p:strVal val="visible"/>
-                                      </p:to>
-                                    </p:set>
-                                  </p:childTnLst>
-                                </p:cTn>
-                              </p:par>
-                              <p:par>
-                                <p:cTn id="9" presetID="1" presetClass="entr" presetSubtype="0" fill="hold" grpId="0" nodeType="withEffect">
+                                <p:cTn id="9" presetID="1" presetClass="entr" presetSubtype="0" fill="hold" grpId="0" nodeType="clickEffect">
                                   <p:stCondLst>
                                     <p:cond delay="0"/>
                                   </p:stCondLst>
@@ -28687,7 +28892,7 @@
                                         <p:tgtEl>
                                           <p:spTgt spid="5">
                                             <p:txEl>
-                                              <p:pRg st="1" end="1"/>
+                                              <p:pRg st="0" end="0"/>
                                             </p:txEl>
                                           </p:spTgt>
                                         </p:tgtEl>
@@ -28721,7 +28926,7 @@
                             </p:stCondLst>
                             <p:childTnLst>
                               <p:par>
-                                <p:cTn id="13" presetID="1" presetClass="entr" presetSubtype="0" fill="hold" nodeType="clickEffect">
+                                <p:cTn id="13" presetID="1" presetClass="entr" presetSubtype="0" fill="hold" grpId="0" nodeType="clickEffect">
                                   <p:stCondLst>
                                     <p:cond delay="0"/>
                                   </p:stCondLst>
@@ -28736,7 +28941,7 @@
                                         <p:tgtEl>
                                           <p:spTgt spid="5">
                                             <p:txEl>
-                                              <p:pRg st="2" end="2"/>
+                                              <p:pRg st="1" end="1"/>
                                             </p:txEl>
                                           </p:spTgt>
                                         </p:tgtEl>
@@ -28785,7 +28990,7 @@
                                         <p:tgtEl>
                                           <p:spTgt spid="5">
                                             <p:txEl>
-                                              <p:pRg st="3" end="3"/>
+                                              <p:pRg st="2" end="2"/>
                                             </p:txEl>
                                           </p:spTgt>
                                         </p:tgtEl>
@@ -28834,7 +29039,7 @@
                                         <p:tgtEl>
                                           <p:spTgt spid="5">
                                             <p:txEl>
-                                              <p:pRg st="4" end="4"/>
+                                              <p:pRg st="3" end="3"/>
                                             </p:txEl>
                                           </p:spTgt>
                                         </p:tgtEl>
@@ -28883,7 +29088,7 @@
                                         <p:tgtEl>
                                           <p:spTgt spid="5">
                                             <p:txEl>
-                                              <p:pRg st="5" end="5"/>
+                                              <p:pRg st="4" end="4"/>
                                             </p:txEl>
                                           </p:spTgt>
                                         </p:tgtEl>
@@ -28932,7 +29137,7 @@
                                         <p:tgtEl>
                                           <p:spTgt spid="5">
                                             <p:txEl>
-                                              <p:pRg st="6" end="6"/>
+                                              <p:pRg st="5" end="5"/>
                                             </p:txEl>
                                           </p:spTgt>
                                         </p:tgtEl>
@@ -28981,7 +29186,7 @@
                                         <p:tgtEl>
                                           <p:spTgt spid="5">
                                             <p:txEl>
-                                              <p:pRg st="7" end="7"/>
+                                              <p:pRg st="6" end="6"/>
                                             </p:txEl>
                                           </p:spTgt>
                                         </p:tgtEl>
@@ -29030,7 +29235,7 @@
                                         <p:tgtEl>
                                           <p:spTgt spid="5">
                                             <p:txEl>
-                                              <p:pRg st="8" end="8"/>
+                                              <p:pRg st="7" end="7"/>
                                             </p:txEl>
                                           </p:spTgt>
                                         </p:tgtEl>
@@ -29079,7 +29284,7 @@
                                         <p:tgtEl>
                                           <p:spTgt spid="5">
                                             <p:txEl>
-                                              <p:pRg st="9" end="9"/>
+                                              <p:pRg st="8" end="8"/>
                                             </p:txEl>
                                           </p:spTgt>
                                         </p:tgtEl>
@@ -29128,7 +29333,105 @@
                                         <p:tgtEl>
                                           <p:spTgt spid="5">
                                             <p:txEl>
+                                              <p:pRg st="9" end="9"/>
+                                            </p:txEl>
+                                          </p:spTgt>
+                                        </p:tgtEl>
+                                        <p:attrNameLst>
+                                          <p:attrName>style.visibility</p:attrName>
+                                        </p:attrNameLst>
+                                      </p:cBhvr>
+                                      <p:to>
+                                        <p:strVal val="visible"/>
+                                      </p:to>
+                                    </p:set>
+                                  </p:childTnLst>
+                                </p:cTn>
+                              </p:par>
+                            </p:childTnLst>
+                          </p:cTn>
+                        </p:par>
+                      </p:childTnLst>
+                    </p:cTn>
+                  </p:par>
+                  <p:par>
+                    <p:cTn id="47" fill="hold">
+                      <p:stCondLst>
+                        <p:cond delay="indefinite"/>
+                      </p:stCondLst>
+                      <p:childTnLst>
+                        <p:par>
+                          <p:cTn id="48" fill="hold">
+                            <p:stCondLst>
+                              <p:cond delay="0"/>
+                            </p:stCondLst>
+                            <p:childTnLst>
+                              <p:par>
+                                <p:cTn id="49" presetID="1" presetClass="entr" presetSubtype="0" fill="hold" nodeType="clickEffect">
+                                  <p:stCondLst>
+                                    <p:cond delay="0"/>
+                                  </p:stCondLst>
+                                  <p:childTnLst>
+                                    <p:set>
+                                      <p:cBhvr>
+                                        <p:cTn id="50" dur="1" fill="hold">
+                                          <p:stCondLst>
+                                            <p:cond delay="0"/>
+                                          </p:stCondLst>
+                                        </p:cTn>
+                                        <p:tgtEl>
+                                          <p:spTgt spid="5">
+                                            <p:txEl>
                                               <p:pRg st="10" end="10"/>
+                                            </p:txEl>
+                                          </p:spTgt>
+                                        </p:tgtEl>
+                                        <p:attrNameLst>
+                                          <p:attrName>style.visibility</p:attrName>
+                                        </p:attrNameLst>
+                                      </p:cBhvr>
+                                      <p:to>
+                                        <p:strVal val="visible"/>
+                                      </p:to>
+                                    </p:set>
+                                  </p:childTnLst>
+                                </p:cTn>
+                              </p:par>
+                            </p:childTnLst>
+                          </p:cTn>
+                        </p:par>
+                      </p:childTnLst>
+                    </p:cTn>
+                  </p:par>
+                  <p:par>
+                    <p:cTn id="51" fill="hold">
+                      <p:stCondLst>
+                        <p:cond delay="indefinite"/>
+                      </p:stCondLst>
+                      <p:childTnLst>
+                        <p:par>
+                          <p:cTn id="52" fill="hold">
+                            <p:stCondLst>
+                              <p:cond delay="0"/>
+                            </p:stCondLst>
+                            <p:childTnLst>
+                              <p:par>
+                                <p:cTn id="53" presetID="1" presetClass="entr" presetSubtype="0" fill="hold" nodeType="clickEffect">
+                                  <p:stCondLst>
+                                    <p:cond delay="0"/>
+                                  </p:stCondLst>
+                                  <p:childTnLst>
+                                    <p:set>
+                                      <p:cBhvr>
+                                        <p:cTn id="54" dur="1" fill="hold">
+                                          <p:stCondLst>
+                                            <p:cond delay="0"/>
+                                          </p:stCondLst>
+                                        </p:cTn>
+                                        <p:tgtEl>
+                                          <p:spTgt spid="5">
+                                            <p:txEl>
+                                              <p:pRg st="11" end="11"/>
                                             </p:txEl>
                                           </p:spTgt>
                                         </p:tgtEl>

</xml_diff>